<commit_message>
fixed miss-spelling in ppt
</commit_message>
<xml_diff>
--- a/Presentations/Robitcorp.pptx
+++ b/Presentations/Robitcorp.pptx
@@ -298,7 +298,7 @@
           <a:p>
             <a:fld id="{259F2308-0062-489E-A213-D3BBB3FA2530}" type="datetimeFigureOut">
               <a:rPr lang="en-US" smtClean="0"/>
-              <a:t>2/10/2013</a:t>
+              <a:t>2/11/13</a:t>
             </a:fld>
             <a:endParaRPr lang="en-US"/>
           </a:p>
@@ -468,7 +468,7 @@
           <a:p>
             <a:fld id="{259F2308-0062-489E-A213-D3BBB3FA2530}" type="datetimeFigureOut">
               <a:rPr lang="en-US" smtClean="0"/>
-              <a:t>2/10/2013</a:t>
+              <a:t>2/11/13</a:t>
             </a:fld>
             <a:endParaRPr lang="en-US"/>
           </a:p>
@@ -648,7 +648,7 @@
           <a:p>
             <a:fld id="{259F2308-0062-489E-A213-D3BBB3FA2530}" type="datetimeFigureOut">
               <a:rPr lang="en-US" smtClean="0"/>
-              <a:t>2/10/2013</a:t>
+              <a:t>2/11/13</a:t>
             </a:fld>
             <a:endParaRPr lang="en-US"/>
           </a:p>
@@ -818,7 +818,7 @@
           <a:p>
             <a:fld id="{259F2308-0062-489E-A213-D3BBB3FA2530}" type="datetimeFigureOut">
               <a:rPr lang="en-US" smtClean="0"/>
-              <a:t>2/10/2013</a:t>
+              <a:t>2/11/13</a:t>
             </a:fld>
             <a:endParaRPr lang="en-US"/>
           </a:p>
@@ -1064,7 +1064,7 @@
           <a:p>
             <a:fld id="{259F2308-0062-489E-A213-D3BBB3FA2530}" type="datetimeFigureOut">
               <a:rPr lang="en-US" smtClean="0"/>
-              <a:t>2/10/2013</a:t>
+              <a:t>2/11/13</a:t>
             </a:fld>
             <a:endParaRPr lang="en-US"/>
           </a:p>
@@ -1352,7 +1352,7 @@
           <a:p>
             <a:fld id="{259F2308-0062-489E-A213-D3BBB3FA2530}" type="datetimeFigureOut">
               <a:rPr lang="en-US" smtClean="0"/>
-              <a:t>2/10/2013</a:t>
+              <a:t>2/11/13</a:t>
             </a:fld>
             <a:endParaRPr lang="en-US"/>
           </a:p>
@@ -1774,7 +1774,7 @@
           <a:p>
             <a:fld id="{259F2308-0062-489E-A213-D3BBB3FA2530}" type="datetimeFigureOut">
               <a:rPr lang="en-US" smtClean="0"/>
-              <a:t>2/10/2013</a:t>
+              <a:t>2/11/13</a:t>
             </a:fld>
             <a:endParaRPr lang="en-US"/>
           </a:p>
@@ -1892,7 +1892,7 @@
           <a:p>
             <a:fld id="{259F2308-0062-489E-A213-D3BBB3FA2530}" type="datetimeFigureOut">
               <a:rPr lang="en-US" smtClean="0"/>
-              <a:t>2/10/2013</a:t>
+              <a:t>2/11/13</a:t>
             </a:fld>
             <a:endParaRPr lang="en-US"/>
           </a:p>
@@ -1987,7 +1987,7 @@
           <a:p>
             <a:fld id="{259F2308-0062-489E-A213-D3BBB3FA2530}" type="datetimeFigureOut">
               <a:rPr lang="en-US" smtClean="0"/>
-              <a:t>2/10/2013</a:t>
+              <a:t>2/11/13</a:t>
             </a:fld>
             <a:endParaRPr lang="en-US"/>
           </a:p>
@@ -2264,7 +2264,7 @@
           <a:p>
             <a:fld id="{259F2308-0062-489E-A213-D3BBB3FA2530}" type="datetimeFigureOut">
               <a:rPr lang="en-US" smtClean="0"/>
-              <a:t>2/10/2013</a:t>
+              <a:t>2/11/13</a:t>
             </a:fld>
             <a:endParaRPr lang="en-US"/>
           </a:p>
@@ -2517,7 +2517,7 @@
           <a:p>
             <a:fld id="{259F2308-0062-489E-A213-D3BBB3FA2530}" type="datetimeFigureOut">
               <a:rPr lang="en-US" smtClean="0"/>
-              <a:t>2/10/2013</a:t>
+              <a:t>2/11/13</a:t>
             </a:fld>
             <a:endParaRPr lang="en-US"/>
           </a:p>
@@ -2730,7 +2730,7 @@
           <a:p>
             <a:fld id="{259F2308-0062-489E-A213-D3BBB3FA2530}" type="datetimeFigureOut">
               <a:rPr lang="en-US" smtClean="0"/>
-              <a:t>2/10/2013</a:t>
+              <a:t>2/11/13</a:t>
             </a:fld>
             <a:endParaRPr lang="en-US"/>
           </a:p>
@@ -3122,7 +3122,7 @@
           <a:p>
             <a:r>
               <a:rPr lang="en-US" b="1" dirty="0" err="1" smtClean="0"/>
-              <a:t>Robitcorp</a:t>
+              <a:t>Roboticorp</a:t>
             </a:r>
             <a:r>
               <a:rPr lang="en-US" b="1" dirty="0" smtClean="0"/>
@@ -3214,7 +3214,7 @@
   <p:timing>
     <p:tnLst>
       <p:par>
-        <p:cTn id="1" dur="indefinite" restart="never" nodeType="tmRoot"/>
+        <p:cTn xmlns:p14="http://schemas.microsoft.com/office/powerpoint/2010/main" id="1" dur="indefinite" restart="never" nodeType="tmRoot"/>
       </p:par>
     </p:tnLst>
   </p:timing>
@@ -3342,7 +3342,7 @@
   <p:timing>
     <p:tnLst>
       <p:par>
-        <p:cTn id="1" dur="indefinite" restart="never" nodeType="tmRoot"/>
+        <p:cTn xmlns:p14="http://schemas.microsoft.com/office/powerpoint/2010/main" id="1" dur="indefinite" restart="never" nodeType="tmRoot"/>
       </p:par>
     </p:tnLst>
   </p:timing>
@@ -3431,7 +3431,7 @@
   <p:timing>
     <p:tnLst>
       <p:par>
-        <p:cTn id="1" dur="indefinite" restart="never" nodeType="tmRoot"/>
+        <p:cTn xmlns:p14="http://schemas.microsoft.com/office/powerpoint/2010/main" id="1" dur="indefinite" restart="never" nodeType="tmRoot"/>
       </p:par>
     </p:tnLst>
   </p:timing>
@@ -3524,7 +3524,7 @@
   <p:timing>
     <p:tnLst>
       <p:par>
-        <p:cTn id="1" dur="indefinite" restart="never" nodeType="tmRoot"/>
+        <p:cTn xmlns:p14="http://schemas.microsoft.com/office/powerpoint/2010/main" id="1" dur="indefinite" restart="never" nodeType="tmRoot"/>
       </p:par>
     </p:tnLst>
   </p:timing>
@@ -3666,7 +3666,7 @@
   <p:timing>
     <p:tnLst>
       <p:par>
-        <p:cTn id="1" dur="indefinite" restart="never" nodeType="tmRoot"/>
+        <p:cTn xmlns:p14="http://schemas.microsoft.com/office/powerpoint/2010/main" id="1" dur="indefinite" restart="never" nodeType="tmRoot"/>
       </p:par>
     </p:tnLst>
   </p:timing>
@@ -3761,7 +3761,7 @@
   <p:timing>
     <p:tnLst>
       <p:par>
-        <p:cTn id="1" dur="indefinite" restart="never" nodeType="tmRoot"/>
+        <p:cTn xmlns:p14="http://schemas.microsoft.com/office/powerpoint/2010/main" id="1" dur="indefinite" restart="never" nodeType="tmRoot"/>
       </p:par>
     </p:tnLst>
   </p:timing>
@@ -3862,7 +3862,7 @@
           <a:graphicData uri="http://schemas.openxmlformats.org/presentationml/2006/ole">
             <mc:AlternateContent xmlns:mc="http://schemas.openxmlformats.org/markup-compatibility/2006">
               <mc:Choice xmlns:v="urn:schemas-microsoft-com:vml" Requires="v">
-                <p:oleObj spid="_x0000_s1029" name="Packager Shell Object" showAsIcon="1" r:id="rId4" imgW="927360" imgH="685800" progId="Package">
+                <p:oleObj spid="_x0000_s1031" name="Packager Shell Object" showAsIcon="1" r:id="rId4" imgW="927360" imgH="685800" progId="Package">
                   <p:embed/>
                 </p:oleObj>
               </mc:Choice>
@@ -3910,7 +3910,7 @@
   <p:timing>
     <p:tnLst>
       <p:par>
-        <p:cTn id="1" dur="indefinite" restart="never" nodeType="tmRoot"/>
+        <p:cTn xmlns:p14="http://schemas.microsoft.com/office/powerpoint/2010/main" id="1" dur="indefinite" restart="never" nodeType="tmRoot"/>
       </p:par>
     </p:tnLst>
   </p:timing>
@@ -4222,7 +4222,7 @@
   <p:timing>
     <p:tnLst>
       <p:par>
-        <p:cTn id="1" dur="indefinite" restart="never" nodeType="tmRoot"/>
+        <p:cTn xmlns:p14="http://schemas.microsoft.com/office/powerpoint/2010/main" id="1" dur="indefinite" restart="never" nodeType="tmRoot"/>
       </p:par>
     </p:tnLst>
   </p:timing>
@@ -4317,7 +4317,7 @@
   <p:timing>
     <p:tnLst>
       <p:par>
-        <p:cTn id="1" dur="indefinite" restart="never" nodeType="tmRoot"/>
+        <p:cTn xmlns:p14="http://schemas.microsoft.com/office/powerpoint/2010/main" id="1" dur="indefinite" restart="never" nodeType="tmRoot"/>
       </p:par>
     </p:tnLst>
   </p:timing>
@@ -4414,7 +4414,7 @@
   <p:timing>
     <p:tnLst>
       <p:par>
-        <p:cTn id="1" dur="indefinite" restart="never" nodeType="tmRoot"/>
+        <p:cTn xmlns:p14="http://schemas.microsoft.com/office/powerpoint/2010/main" id="1" dur="indefinite" restart="never" nodeType="tmRoot"/>
       </p:par>
     </p:tnLst>
   </p:timing>
@@ -4543,7 +4543,7 @@
   <p:timing>
     <p:tnLst>
       <p:par>
-        <p:cTn id="1" dur="indefinite" restart="never" nodeType="tmRoot"/>
+        <p:cTn xmlns:p14="http://schemas.microsoft.com/office/powerpoint/2010/main" id="1" dur="indefinite" restart="never" nodeType="tmRoot"/>
       </p:par>
     </p:tnLst>
   </p:timing>

</xml_diff>